<commit_message>
Deploy website Wed Jul 17 10:31:40 PM PDT 2024
</commit_message>
<xml_diff>
--- a/assets/slides/su24/17-Linked_Lists.pptx
+++ b/assets/slides/su24/17-Linked_Lists.pptx
@@ -5,34 +5,31 @@
     <p:sldMasterId id="2147484034" r:id="rId1"/>
   </p:sldMasterIdLst>
   <p:notesMasterIdLst>
-    <p:notesMasterId r:id="rId24"/>
+    <p:notesMasterId r:id="rId21"/>
   </p:notesMasterIdLst>
   <p:handoutMasterIdLst>
-    <p:handoutMasterId r:id="rId25"/>
+    <p:handoutMasterId r:id="rId22"/>
   </p:handoutMasterIdLst>
   <p:sldIdLst>
     <p:sldId id="360" r:id="rId2"/>
     <p:sldId id="1082" r:id="rId3"/>
-    <p:sldId id="1077" r:id="rId4"/>
-    <p:sldId id="1081" r:id="rId5"/>
-    <p:sldId id="1079" r:id="rId6"/>
-    <p:sldId id="403" r:id="rId7"/>
-    <p:sldId id="1065" r:id="rId8"/>
-    <p:sldId id="1068" r:id="rId9"/>
-    <p:sldId id="1066" r:id="rId10"/>
-    <p:sldId id="1073" r:id="rId11"/>
-    <p:sldId id="1078" r:id="rId12"/>
-    <p:sldId id="1070" r:id="rId13"/>
-    <p:sldId id="1084" r:id="rId14"/>
-    <p:sldId id="1080" r:id="rId15"/>
-    <p:sldId id="1076" r:id="rId16"/>
-    <p:sldId id="1085" r:id="rId17"/>
-    <p:sldId id="1071" r:id="rId18"/>
-    <p:sldId id="1074" r:id="rId19"/>
-    <p:sldId id="1072" r:id="rId20"/>
-    <p:sldId id="1083" r:id="rId21"/>
-    <p:sldId id="1086" r:id="rId22"/>
-    <p:sldId id="1075" r:id="rId23"/>
+    <p:sldId id="1079" r:id="rId4"/>
+    <p:sldId id="403" r:id="rId5"/>
+    <p:sldId id="1065" r:id="rId6"/>
+    <p:sldId id="1068" r:id="rId7"/>
+    <p:sldId id="1066" r:id="rId8"/>
+    <p:sldId id="1073" r:id="rId9"/>
+    <p:sldId id="1078" r:id="rId10"/>
+    <p:sldId id="1070" r:id="rId11"/>
+    <p:sldId id="1084" r:id="rId12"/>
+    <p:sldId id="1080" r:id="rId13"/>
+    <p:sldId id="1076" r:id="rId14"/>
+    <p:sldId id="1085" r:id="rId15"/>
+    <p:sldId id="1071" r:id="rId16"/>
+    <p:sldId id="1074" r:id="rId17"/>
+    <p:sldId id="1072" r:id="rId18"/>
+    <p:sldId id="1083" r:id="rId19"/>
+    <p:sldId id="1075" r:id="rId20"/>
   </p:sldIdLst>
   <p:sldSz cx="12192000" cy="6858000"/>
   <p:notesSz cx="6997700" cy="9194800"/>
@@ -668,14 +665,14 @@
           </a:ln>
           <a:extLst>
             <a:ext uri="{909E8E84-426E-40dd-AFC4-6F175D3DCCD1}">
-              <a14:hiddenFill xmlns="" xmlns:a14="http://schemas.microsoft.com/office/drawing/2010/main">
+              <a14:hiddenFill xmlns:a14="http://schemas.microsoft.com/office/drawing/2010/main" xmlns="">
                 <a:solidFill>
                   <a:srgbClr val="FFFFFF"/>
                 </a:solidFill>
               </a14:hiddenFill>
             </a:ext>
             <a:ext uri="{91240B29-F687-4f45-9708-019B960494DF}">
-              <a14:hiddenLine xmlns="" xmlns:a14="http://schemas.microsoft.com/office/drawing/2010/main" w="9525">
+              <a14:hiddenLine xmlns:a14="http://schemas.microsoft.com/office/drawing/2010/main" xmlns="" w="9525">
                 <a:solidFill>
                   <a:srgbClr val="000000"/>
                 </a:solidFill>
@@ -743,14 +740,14 @@
           </a:ln>
           <a:extLst>
             <a:ext uri="{909E8E84-426E-40dd-AFC4-6F175D3DCCD1}">
-              <a14:hiddenFill xmlns="" xmlns:a14="http://schemas.microsoft.com/office/drawing/2010/main">
+              <a14:hiddenFill xmlns:a14="http://schemas.microsoft.com/office/drawing/2010/main" xmlns="">
                 <a:solidFill>
                   <a:srgbClr val="FFFFFF"/>
                 </a:solidFill>
               </a14:hiddenFill>
             </a:ext>
             <a:ext uri="{FAA26D3D-D897-4be2-8F04-BA451C77F1D7}">
-              <ma14:placeholderFlag xmlns="" xmlns:ma14="http://schemas.microsoft.com/office/mac/drawingml/2011/main" val="1"/>
+              <ma14:placeholderFlag xmlns:ma14="http://schemas.microsoft.com/office/mac/drawingml/2011/main" xmlns="" val="1"/>
             </a:ext>
           </a:extLst>
         </p:spPr>
@@ -1007,14 +1004,14 @@
           <a:ln/>
           <a:extLst>
             <a:ext uri="{909E8E84-426E-40dd-AFC4-6F175D3DCCD1}">
-              <a14:hiddenFill xmlns="" xmlns:a14="http://schemas.microsoft.com/office/drawing/2010/main">
+              <a14:hiddenFill xmlns:a14="http://schemas.microsoft.com/office/drawing/2010/main" xmlns="">
                 <a:solidFill>
                   <a:srgbClr val="FFFFFF"/>
                 </a:solidFill>
               </a14:hiddenFill>
             </a:ext>
             <a:ext uri="{91240B29-F687-4f45-9708-019B960494DF}">
-              <a14:hiddenLine xmlns="" xmlns:a14="http://schemas.microsoft.com/office/drawing/2010/main" w="9525">
+              <a14:hiddenLine xmlns:a14="http://schemas.microsoft.com/office/drawing/2010/main" xmlns="" w="9525">
                 <a:solidFill>
                   <a:srgbClr val="000000"/>
                 </a:solidFill>
@@ -1182,14 +1179,14 @@
           <a:ln/>
           <a:extLst>
             <a:ext uri="{909E8E84-426E-40dd-AFC4-6F175D3DCCD1}">
-              <a14:hiddenFill xmlns="" xmlns:a14="http://schemas.microsoft.com/office/drawing/2010/main">
+              <a14:hiddenFill xmlns:a14="http://schemas.microsoft.com/office/drawing/2010/main" xmlns="">
                 <a:solidFill>
                   <a:srgbClr val="FFFFFF"/>
                 </a:solidFill>
               </a14:hiddenFill>
             </a:ext>
             <a:ext uri="{91240B29-F687-4f45-9708-019B960494DF}">
-              <a14:hiddenLine xmlns="" xmlns:a14="http://schemas.microsoft.com/office/drawing/2010/main" w="9525">
+              <a14:hiddenLine xmlns:a14="http://schemas.microsoft.com/office/drawing/2010/main" xmlns="" w="9525">
                 <a:solidFill>
                   <a:srgbClr val="000000"/>
                 </a:solidFill>
@@ -1199,7 +1196,7 @@
               </a14:hiddenLine>
             </a:ext>
             <a:ext uri="{FAA26D3D-D897-4be2-8F04-BA451C77F1D7}">
-              <ma14:placeholderFlag xmlns="" xmlns:ma14="http://schemas.microsoft.com/office/mac/drawingml/2011/main" val="1"/>
+              <ma14:placeholderFlag xmlns:ma14="http://schemas.microsoft.com/office/mac/drawingml/2011/main" xmlns="" val="1"/>
             </a:ext>
           </a:extLst>
         </p:spPr>
@@ -1297,7 +1294,7 @@
               <a:pPr>
                 <a:defRPr/>
               </a:pPr>
-              <a:t>22</a:t>
+              <a:t>19</a:t>
             </a:fld>
             <a:endParaRPr lang="en-US"/>
           </a:p>
@@ -4065,7 +4062,7 @@
           </a:ln>
           <a:extLst>
             <a:ext uri="{909E8E84-426E-40dd-AFC4-6F175D3DCCD1}">
-              <a14:hiddenFill xmlns:a14="http://schemas.microsoft.com/office/drawing/2010/main" xmlns="">
+              <a14:hiddenFill xmlns="" xmlns:a14="http://schemas.microsoft.com/office/drawing/2010/main">
                 <a:noFill/>
               </a14:hiddenFill>
             </a:ext>
@@ -4187,14 +4184,14 @@
           </a:ln>
           <a:extLst>
             <a:ext uri="{909E8E84-426E-40dd-AFC4-6F175D3DCCD1}">
-              <a14:hiddenFill xmlns:a14="http://schemas.microsoft.com/office/drawing/2010/main" xmlns="">
+              <a14:hiddenFill xmlns="" xmlns:a14="http://schemas.microsoft.com/office/drawing/2010/main">
                 <a:solidFill>
                   <a:srgbClr val="FFFFFF"/>
                 </a:solidFill>
               </a14:hiddenFill>
             </a:ext>
             <a:ext uri="{91240B29-F687-4f45-9708-019B960494DF}">
-              <a14:hiddenLine xmlns:a14="http://schemas.microsoft.com/office/drawing/2010/main" xmlns="" w="9525">
+              <a14:hiddenLine xmlns="" xmlns:a14="http://schemas.microsoft.com/office/drawing/2010/main" w="9525">
                 <a:solidFill>
                   <a:srgbClr val="000000"/>
                 </a:solidFill>
@@ -4204,7 +4201,7 @@
               </a14:hiddenLine>
             </a:ext>
             <a:ext uri="{FAA26D3D-D897-4be2-8F04-BA451C77F1D7}">
-              <ma14:placeholderFlag xmlns:ma14="http://schemas.microsoft.com/office/mac/drawingml/2011/main" xmlns="" val="1"/>
+              <ma14:placeholderFlag xmlns="" xmlns:ma14="http://schemas.microsoft.com/office/mac/drawingml/2011/main" val="1"/>
             </a:ext>
           </a:extLst>
         </p:spPr>
@@ -4762,7 +4759,7 @@
           </a:ln>
           <a:extLst>
             <a:ext uri="{909E8E84-426E-40dd-AFC4-6F175D3DCCD1}">
-              <a14:hiddenFill xmlns:a14="http://schemas.microsoft.com/office/drawing/2010/main" xmlns="">
+              <a14:hiddenFill xmlns="" xmlns:a14="http://schemas.microsoft.com/office/drawing/2010/main">
                 <a:noFill/>
               </a14:hiddenFill>
             </a:ext>
@@ -4807,14 +4804,14 @@
           </a:ln>
           <a:extLst>
             <a:ext uri="{909E8E84-426E-40dd-AFC4-6F175D3DCCD1}">
-              <a14:hiddenFill xmlns:a14="http://schemas.microsoft.com/office/drawing/2010/main" xmlns="">
+              <a14:hiddenFill xmlns="" xmlns:a14="http://schemas.microsoft.com/office/drawing/2010/main">
                 <a:solidFill>
                   <a:srgbClr val="FFFFFF"/>
                 </a:solidFill>
               </a14:hiddenFill>
             </a:ext>
             <a:ext uri="{91240B29-F687-4f45-9708-019B960494DF}">
-              <a14:hiddenLine xmlns:a14="http://schemas.microsoft.com/office/drawing/2010/main" xmlns="" w="9525">
+              <a14:hiddenLine xmlns="" xmlns:a14="http://schemas.microsoft.com/office/drawing/2010/main" w="9525">
                 <a:solidFill>
                   <a:srgbClr val="000000"/>
                 </a:solidFill>
@@ -4922,14 +4919,14 @@
           </a:ln>
           <a:extLst>
             <a:ext uri="{909E8E84-426E-40dd-AFC4-6F175D3DCCD1}">
-              <a14:hiddenFill xmlns:a14="http://schemas.microsoft.com/office/drawing/2010/main" xmlns="">
+              <a14:hiddenFill xmlns="" xmlns:a14="http://schemas.microsoft.com/office/drawing/2010/main">
                 <a:solidFill>
                   <a:srgbClr val="FFFFFF"/>
                 </a:solidFill>
               </a14:hiddenFill>
             </a:ext>
             <a:ext uri="{91240B29-F687-4f45-9708-019B960494DF}">
-              <a14:hiddenLine xmlns:a14="http://schemas.microsoft.com/office/drawing/2010/main" xmlns="" w="9525">
+              <a14:hiddenLine xmlns="" xmlns:a14="http://schemas.microsoft.com/office/drawing/2010/main" w="9525">
                 <a:solidFill>
                   <a:srgbClr val="000000"/>
                 </a:solidFill>
@@ -4939,7 +4936,7 @@
               </a14:hiddenLine>
             </a:ext>
             <a:ext uri="{FAA26D3D-D897-4be2-8F04-BA451C77F1D7}">
-              <ma14:placeholderFlag xmlns:ma14="http://schemas.microsoft.com/office/mac/drawingml/2011/main" xmlns="" val="1"/>
+              <ma14:placeholderFlag xmlns="" xmlns:ma14="http://schemas.microsoft.com/office/mac/drawingml/2011/main" val="1"/>
             </a:ext>
           </a:extLst>
         </p:spPr>
@@ -5287,14 +5284,14 @@
           </a:ln>
           <a:extLst>
             <a:ext uri="{909E8E84-426E-40dd-AFC4-6F175D3DCCD1}">
-              <a14:hiddenFill xmlns:a14="http://schemas.microsoft.com/office/drawing/2010/main" xmlns="">
+              <a14:hiddenFill xmlns="" xmlns:a14="http://schemas.microsoft.com/office/drawing/2010/main">
                 <a:solidFill>
                   <a:srgbClr val="FFFFFF"/>
                 </a:solidFill>
               </a14:hiddenFill>
             </a:ext>
             <a:ext uri="{91240B29-F687-4f45-9708-019B960494DF}">
-              <a14:hiddenLine xmlns:a14="http://schemas.microsoft.com/office/drawing/2010/main" xmlns="" w="9525">
+              <a14:hiddenLine xmlns="" xmlns:a14="http://schemas.microsoft.com/office/drawing/2010/main" w="9525">
                 <a:solidFill>
                   <a:srgbClr val="000000"/>
                 </a:solidFill>
@@ -5304,7 +5301,7 @@
               </a14:hiddenLine>
             </a:ext>
             <a:ext uri="{FAA26D3D-D897-4be2-8F04-BA451C77F1D7}">
-              <ma14:placeholderFlag xmlns:ma14="http://schemas.microsoft.com/office/mac/drawingml/2011/main" xmlns="" val="1"/>
+              <ma14:placeholderFlag xmlns="" xmlns:ma14="http://schemas.microsoft.com/office/mac/drawingml/2011/main" val="1"/>
             </a:ext>
           </a:extLst>
         </p:spPr>
@@ -6365,7 +6362,7 @@
           </a:ln>
           <a:extLst>
             <a:ext uri="{909E8E84-426E-40dd-AFC4-6F175D3DCCD1}">
-              <a14:hiddenFill xmlns="" xmlns:a14="http://schemas.microsoft.com/office/drawing/2010/main">
+              <a14:hiddenFill xmlns:a14="http://schemas.microsoft.com/office/drawing/2010/main" xmlns="">
                 <a:noFill/>
               </a14:hiddenFill>
             </a:ext>
@@ -6490,14 +6487,14 @@
           </a:ln>
           <a:extLst>
             <a:ext uri="{909E8E84-426E-40dd-AFC4-6F175D3DCCD1}">
-              <a14:hiddenFill xmlns="" xmlns:a14="http://schemas.microsoft.com/office/drawing/2010/main">
+              <a14:hiddenFill xmlns:a14="http://schemas.microsoft.com/office/drawing/2010/main" xmlns="">
                 <a:solidFill>
                   <a:srgbClr val="FFFFFF"/>
                 </a:solidFill>
               </a14:hiddenFill>
             </a:ext>
             <a:ext uri="{91240B29-F687-4f45-9708-019B960494DF}">
-              <a14:hiddenLine xmlns="" xmlns:a14="http://schemas.microsoft.com/office/drawing/2010/main" w="9525">
+              <a14:hiddenLine xmlns:a14="http://schemas.microsoft.com/office/drawing/2010/main" xmlns="" w="9525">
                 <a:solidFill>
                   <a:srgbClr val="000000"/>
                 </a:solidFill>
@@ -6507,7 +6504,7 @@
               </a14:hiddenLine>
             </a:ext>
             <a:ext uri="{FAA26D3D-D897-4be2-8F04-BA451C77F1D7}">
-              <ma14:placeholderFlag xmlns="" xmlns:ma14="http://schemas.microsoft.com/office/mac/drawingml/2011/main" val="1"/>
+              <ma14:placeholderFlag xmlns:ma14="http://schemas.microsoft.com/office/mac/drawingml/2011/main" xmlns="" val="1"/>
             </a:ext>
           </a:extLst>
         </p:spPr>
@@ -8650,14 +8647,14 @@
           </a:ln>
           <a:extLst>
             <a:ext uri="{909E8E84-426E-40dd-AFC4-6F175D3DCCD1}">
-              <a14:hiddenFill xmlns="" xmlns:a14="http://schemas.microsoft.com/office/drawing/2010/main">
+              <a14:hiddenFill xmlns:a14="http://schemas.microsoft.com/office/drawing/2010/main" xmlns="">
                 <a:solidFill>
                   <a:srgbClr val="FFFFFF"/>
                 </a:solidFill>
               </a14:hiddenFill>
             </a:ext>
             <a:ext uri="{91240B29-F687-4f45-9708-019B960494DF}">
-              <a14:hiddenLine xmlns="" xmlns:a14="http://schemas.microsoft.com/office/drawing/2010/main" w="9525">
+              <a14:hiddenLine xmlns:a14="http://schemas.microsoft.com/office/drawing/2010/main" xmlns="" w="9525">
                 <a:solidFill>
                   <a:srgbClr val="000000"/>
                 </a:solidFill>
@@ -8667,7 +8664,7 @@
               </a14:hiddenLine>
             </a:ext>
             <a:ext uri="{FAA26D3D-D897-4be2-8F04-BA451C77F1D7}">
-              <ma14:placeholderFlag xmlns="" xmlns:ma14="http://schemas.microsoft.com/office/mac/drawingml/2011/main" val="1"/>
+              <ma14:placeholderFlag xmlns:ma14="http://schemas.microsoft.com/office/mac/drawingml/2011/main" xmlns="" val="1"/>
             </a:ext>
           </a:extLst>
         </p:spPr>
@@ -8712,14 +8709,14 @@
           </a:ln>
           <a:extLst>
             <a:ext uri="{909E8E84-426E-40dd-AFC4-6F175D3DCCD1}">
-              <a14:hiddenFill xmlns="" xmlns:a14="http://schemas.microsoft.com/office/drawing/2010/main">
+              <a14:hiddenFill xmlns:a14="http://schemas.microsoft.com/office/drawing/2010/main" xmlns="">
                 <a:solidFill>
                   <a:srgbClr val="FFFFFF"/>
                 </a:solidFill>
               </a14:hiddenFill>
             </a:ext>
             <a:ext uri="{91240B29-F687-4f45-9708-019B960494DF}">
-              <a14:hiddenLine xmlns="" xmlns:a14="http://schemas.microsoft.com/office/drawing/2010/main" w="9525">
+              <a14:hiddenLine xmlns:a14="http://schemas.microsoft.com/office/drawing/2010/main" xmlns="" w="9525">
                 <a:solidFill>
                   <a:srgbClr val="000000"/>
                 </a:solidFill>
@@ -8729,7 +8726,7 @@
               </a14:hiddenLine>
             </a:ext>
             <a:ext uri="{FAA26D3D-D897-4be2-8F04-BA451C77F1D7}">
-              <ma14:placeholderFlag xmlns="" xmlns:ma14="http://schemas.microsoft.com/office/mac/drawingml/2011/main" val="1"/>
+              <ma14:placeholderFlag xmlns:ma14="http://schemas.microsoft.com/office/mac/drawingml/2011/main" xmlns="" val="1"/>
             </a:ext>
           </a:extLst>
         </p:spPr>
@@ -9408,7 +9405,13 @@
           <a:p>
             <a:r>
               <a:rPr lang="en-US" sz="2000" dirty="0"/>
-              <a:t>Guest Lecture (Rebecca Dang)</a:t>
+              <a:t>Week 5, Summer 2024. 7/18 (Thurs)</a:t>
+            </a:r>
+          </a:p>
+          <a:p>
+            <a:r>
+              <a:rPr lang="en-US" sz="2000" dirty="0"/>
+              <a:t>Lecture 17</a:t>
             </a:r>
           </a:p>
         </p:txBody>
@@ -9435,433 +9438,6 @@
 </file>
 
 <file path=ppt/slides/slide10.xml><?xml version="1.0" encoding="utf-8"?>
-<p:sld xmlns:a="http://schemas.openxmlformats.org/drawingml/2006/main" xmlns:r="http://schemas.openxmlformats.org/officeDocument/2006/relationships" xmlns:p="http://schemas.openxmlformats.org/presentationml/2006/main">
-  <p:cSld>
-    <p:spTree>
-      <p:nvGrpSpPr>
-        <p:cNvPr id="1" name=""/>
-        <p:cNvGrpSpPr/>
-        <p:nvPr/>
-      </p:nvGrpSpPr>
-      <p:grpSpPr>
-        <a:xfrm>
-          <a:off x="0" y="0"/>
-          <a:ext cx="0" cy="0"/>
-          <a:chOff x="0" y="0"/>
-          <a:chExt cx="0" cy="0"/>
-        </a:xfrm>
-      </p:grpSpPr>
-      <p:sp>
-        <p:nvSpPr>
-          <p:cNvPr id="2" name="Title 1">
-            <a:extLst>
-              <a:ext uri="{FF2B5EF4-FFF2-40B4-BE49-F238E27FC236}">
-                <a16:creationId xmlns:a16="http://schemas.microsoft.com/office/drawing/2014/main" id="{2FBD1DEF-F9AE-E0EF-60F8-8CC174573B0B}"/>
-              </a:ext>
-            </a:extLst>
-          </p:cNvPr>
-          <p:cNvSpPr>
-            <a:spLocks noGrp="1"/>
-          </p:cNvSpPr>
-          <p:nvPr>
-            <p:ph type="title"/>
-          </p:nvPr>
-        </p:nvSpPr>
-        <p:spPr/>
-        <p:txBody>
-          <a:bodyPr/>
-          <a:lstStyle/>
-          <a:p>
-            <a:r>
-              <a:rPr lang="en-US" dirty="0"/>
-              <a:t>What's Needed For a Linked List?</a:t>
-            </a:r>
-          </a:p>
-        </p:txBody>
-      </p:sp>
-      <p:sp>
-        <p:nvSpPr>
-          <p:cNvPr id="3" name="Content Placeholder 2">
-            <a:extLst>
-              <a:ext uri="{FF2B5EF4-FFF2-40B4-BE49-F238E27FC236}">
-                <a16:creationId xmlns:a16="http://schemas.microsoft.com/office/drawing/2014/main" id="{832B26A4-DA85-483A-8118-58B23E105264}"/>
-              </a:ext>
-            </a:extLst>
-          </p:cNvPr>
-          <p:cNvSpPr>
-            <a:spLocks noGrp="1"/>
-          </p:cNvSpPr>
-          <p:nvPr>
-            <p:ph idx="1"/>
-          </p:nvPr>
-        </p:nvSpPr>
-        <p:spPr/>
-        <p:txBody>
-          <a:bodyPr/>
-          <a:lstStyle/>
-          <a:p>
-            <a:r>
-              <a:rPr lang="en-US" sz="2800" dirty="0">
-                <a:latin typeface="Source Code Pro" panose="020B0509030403020204" pitchFamily="49" charset="77"/>
-              </a:rPr>
-              <a:t> first</a:t>
-            </a:r>
-          </a:p>
-          <a:p>
-            <a:r>
-              <a:rPr lang="en-US" sz="2800" dirty="0">
-                <a:latin typeface="Source Code Pro" panose="020B0509030403020204" pitchFamily="49" charset="77"/>
-              </a:rPr>
-              <a:t> rest</a:t>
-            </a:r>
-          </a:p>
-          <a:p>
-            <a:r>
-              <a:rPr lang="en-US" sz="2800" dirty="0">
-                <a:latin typeface="Helvetica" pitchFamily="2" charset="0"/>
-              </a:rPr>
-              <a:t> An idea of “empty”</a:t>
-            </a:r>
-          </a:p>
-          <a:p>
-            <a:r>
-              <a:rPr lang="en-US" sz="2800" dirty="0"/>
-              <a:t> </a:t>
-            </a:r>
-            <a:r>
-              <a:rPr lang="en-US" sz="2800" b="1" dirty="0"/>
-              <a:t>Nothing else is </a:t>
-            </a:r>
-            <a:r>
-              <a:rPr lang="en-US" sz="2800" b="1" i="1" dirty="0"/>
-              <a:t>necessary</a:t>
-            </a:r>
-            <a:endParaRPr lang="en-US" sz="2800" i="1" dirty="0"/>
-          </a:p>
-          <a:p>
-            <a:r>
-              <a:rPr lang="en-US" sz="2800" dirty="0"/>
-              <a:t> </a:t>
-            </a:r>
-            <a:r>
-              <a:rPr lang="en-US" sz="2800" dirty="0">
-                <a:latin typeface="Source Code Pro" panose="020B0509030403020204" pitchFamily="49" charset="77"/>
-              </a:rPr>
-              <a:t>__</a:t>
-            </a:r>
-            <a:r>
-              <a:rPr lang="en-US" sz="2800" dirty="0" err="1">
-                <a:latin typeface="Source Code Pro" panose="020B0509030403020204" pitchFamily="49" charset="77"/>
-              </a:rPr>
-              <a:t>repr</a:t>
-            </a:r>
-            <a:r>
-              <a:rPr lang="en-US" sz="2800" dirty="0">
-                <a:latin typeface="Source Code Pro" panose="020B0509030403020204" pitchFamily="49" charset="77"/>
-              </a:rPr>
-              <a:t>__, __</a:t>
-            </a:r>
-            <a:r>
-              <a:rPr lang="en-US" sz="2800" dirty="0" err="1">
-                <a:latin typeface="Source Code Pro" panose="020B0509030403020204" pitchFamily="49" charset="77"/>
-              </a:rPr>
-              <a:t>len</a:t>
-            </a:r>
-            <a:r>
-              <a:rPr lang="en-US" sz="2800" dirty="0">
-                <a:latin typeface="Source Code Pro" panose="020B0509030403020204" pitchFamily="49" charset="77"/>
-              </a:rPr>
-              <a:t>__ </a:t>
-            </a:r>
-            <a:r>
-              <a:rPr lang="en-US" sz="2800" dirty="0"/>
-              <a:t>methods are all useful shortcuts and useful recursion practice. </a:t>
-            </a:r>
-          </a:p>
-        </p:txBody>
-      </p:sp>
-    </p:spTree>
-    <p:extLst>
-      <p:ext uri="{BB962C8B-B14F-4D97-AF65-F5344CB8AC3E}">
-        <p14:creationId xmlns:p14="http://schemas.microsoft.com/office/powerpoint/2010/main" val="731253351"/>
-      </p:ext>
-    </p:extLst>
-  </p:cSld>
-  <p:clrMapOvr>
-    <a:masterClrMapping/>
-  </p:clrMapOvr>
-</p:sld>
-</file>
-
-<file path=ppt/slides/slide11.xml><?xml version="1.0" encoding="utf-8"?>
-<p:sld xmlns:a="http://schemas.openxmlformats.org/drawingml/2006/main" xmlns:r="http://schemas.openxmlformats.org/officeDocument/2006/relationships" xmlns:p="http://schemas.openxmlformats.org/presentationml/2006/main">
-  <p:cSld>
-    <p:spTree>
-      <p:nvGrpSpPr>
-        <p:cNvPr id="1" name=""/>
-        <p:cNvGrpSpPr/>
-        <p:nvPr/>
-      </p:nvGrpSpPr>
-      <p:grpSpPr>
-        <a:xfrm>
-          <a:off x="0" y="0"/>
-          <a:ext cx="0" cy="0"/>
-          <a:chOff x="0" y="0"/>
-          <a:chExt cx="0" cy="0"/>
-        </a:xfrm>
-      </p:grpSpPr>
-      <p:sp>
-        <p:nvSpPr>
-          <p:cNvPr id="2" name="Title 1">
-            <a:extLst>
-              <a:ext uri="{FF2B5EF4-FFF2-40B4-BE49-F238E27FC236}">
-                <a16:creationId xmlns:a16="http://schemas.microsoft.com/office/drawing/2014/main" id="{A7F86FD9-07DA-5F05-5C56-E4613EB607B1}"/>
-              </a:ext>
-            </a:extLst>
-          </p:cNvPr>
-          <p:cNvSpPr>
-            <a:spLocks noGrp="1"/>
-          </p:cNvSpPr>
-          <p:nvPr>
-            <p:ph type="title"/>
-          </p:nvPr>
-        </p:nvSpPr>
-        <p:spPr/>
-        <p:txBody>
-          <a:bodyPr/>
-          <a:lstStyle/>
-          <a:p>
-            <a:r>
-              <a:rPr lang="en-US" dirty="0"/>
-              <a:t>The Link Class</a:t>
-            </a:r>
-          </a:p>
-        </p:txBody>
-      </p:sp>
-      <p:sp>
-        <p:nvSpPr>
-          <p:cNvPr id="3" name="Content Placeholder 2">
-            <a:extLst>
-              <a:ext uri="{FF2B5EF4-FFF2-40B4-BE49-F238E27FC236}">
-                <a16:creationId xmlns:a16="http://schemas.microsoft.com/office/drawing/2014/main" id="{1CB2F8BF-9A4D-2337-4D5F-66455AD4AD53}"/>
-              </a:ext>
-            </a:extLst>
-          </p:cNvPr>
-          <p:cNvSpPr>
-            <a:spLocks noGrp="1"/>
-          </p:cNvSpPr>
-          <p:nvPr>
-            <p:ph idx="1"/>
-          </p:nvPr>
-        </p:nvSpPr>
-        <p:spPr/>
-        <p:txBody>
-          <a:bodyPr/>
-          <a:lstStyle/>
-          <a:p>
-            <a:pPr marL="0" indent="0">
-              <a:buNone/>
-            </a:pPr>
-            <a:r>
-              <a:rPr lang="en-US" dirty="0">
-                <a:latin typeface="Source Code Pro" panose="020B0509030403020204" pitchFamily="49" charset="77"/>
-              </a:rPr>
-              <a:t>class Link:</a:t>
-            </a:r>
-          </a:p>
-          <a:p>
-            <a:pPr marL="0" indent="0">
-              <a:buNone/>
-            </a:pPr>
-            <a:r>
-              <a:rPr lang="en-US" dirty="0">
-                <a:latin typeface="Source Code Pro" panose="020B0509030403020204" pitchFamily="49" charset="77"/>
-              </a:rPr>
-              <a:t>    empty = ()</a:t>
-            </a:r>
-          </a:p>
-          <a:p>
-            <a:pPr marL="0" indent="0">
-              <a:buNone/>
-            </a:pPr>
-            <a:r>
-              <a:rPr lang="en-US" dirty="0">
-                <a:latin typeface="Source Code Pro" panose="020B0509030403020204" pitchFamily="49" charset="77"/>
-              </a:rPr>
-              <a:t>    def __</a:t>
-            </a:r>
-            <a:r>
-              <a:rPr lang="en-US" dirty="0" err="1">
-                <a:latin typeface="Source Code Pro" panose="020B0509030403020204" pitchFamily="49" charset="77"/>
-              </a:rPr>
-              <a:t>init</a:t>
-            </a:r>
-            <a:r>
-              <a:rPr lang="en-US" dirty="0">
-                <a:latin typeface="Source Code Pro" panose="020B0509030403020204" pitchFamily="49" charset="77"/>
-              </a:rPr>
-              <a:t>__(self, first, rest=empty):</a:t>
-            </a:r>
-          </a:p>
-          <a:p>
-            <a:pPr marL="0" indent="0">
-              <a:buNone/>
-            </a:pPr>
-            <a:r>
-              <a:rPr lang="en-US" dirty="0">
-                <a:latin typeface="Source Code Pro" panose="020B0509030403020204" pitchFamily="49" charset="77"/>
-              </a:rPr>
-              <a:t>        </a:t>
-            </a:r>
-            <a:r>
-              <a:rPr lang="en-US" dirty="0" err="1">
-                <a:latin typeface="Source Code Pro" panose="020B0509030403020204" pitchFamily="49" charset="77"/>
-              </a:rPr>
-              <a:t>self.first</a:t>
-            </a:r>
-            <a:r>
-              <a:rPr lang="en-US" dirty="0">
-                <a:latin typeface="Source Code Pro" panose="020B0509030403020204" pitchFamily="49" charset="77"/>
-              </a:rPr>
-              <a:t> = first</a:t>
-            </a:r>
-          </a:p>
-          <a:p>
-            <a:pPr marL="0" indent="0">
-              <a:buNone/>
-            </a:pPr>
-            <a:r>
-              <a:rPr lang="en-US" dirty="0">
-                <a:latin typeface="Source Code Pro" panose="020B0509030403020204" pitchFamily="49" charset="77"/>
-              </a:rPr>
-              <a:t>        </a:t>
-            </a:r>
-            <a:r>
-              <a:rPr lang="en-US" dirty="0" err="1">
-                <a:latin typeface="Source Code Pro" panose="020B0509030403020204" pitchFamily="49" charset="77"/>
-              </a:rPr>
-              <a:t>self.rest</a:t>
-            </a:r>
-            <a:r>
-              <a:rPr lang="en-US" dirty="0">
-                <a:latin typeface="Source Code Pro" panose="020B0509030403020204" pitchFamily="49" charset="77"/>
-              </a:rPr>
-              <a:t> = rest</a:t>
-            </a:r>
-          </a:p>
-          <a:p>
-            <a:pPr marL="0" indent="0">
-              <a:buNone/>
-            </a:pPr>
-            <a:endParaRPr lang="en-US" dirty="0">
-              <a:latin typeface="Source Code Pro" panose="020B0509030403020204" pitchFamily="49" charset="77"/>
-            </a:endParaRPr>
-          </a:p>
-          <a:p>
-            <a:pPr marL="0" indent="0">
-              <a:buNone/>
-            </a:pPr>
-            <a:r>
-              <a:rPr lang="en-US" dirty="0">
-                <a:latin typeface="Open Sans Light" panose="020B0606030504020204" pitchFamily="34" charset="0"/>
-                <a:ea typeface="Open Sans Light" panose="020B0606030504020204" pitchFamily="34" charset="0"/>
-                <a:cs typeface="Open Sans Light" panose="020B0606030504020204" pitchFamily="34" charset="0"/>
-              </a:rPr>
-              <a:t>That's all we need!</a:t>
-            </a:r>
-          </a:p>
-          <a:p>
-            <a:r>
-              <a:rPr lang="en-US" dirty="0">
-                <a:latin typeface="Open Sans Light" panose="020B0606030504020204" pitchFamily="34" charset="0"/>
-                <a:ea typeface="Open Sans Light" panose="020B0606030504020204" pitchFamily="34" charset="0"/>
-                <a:cs typeface="Open Sans Light" panose="020B0606030504020204" pitchFamily="34" charset="0"/>
-              </a:rPr>
-              <a:t> We can add a __</a:t>
-            </a:r>
-            <a:r>
-              <a:rPr lang="en-US" dirty="0" err="1">
-                <a:latin typeface="Open Sans Light" panose="020B0606030504020204" pitchFamily="34" charset="0"/>
-                <a:ea typeface="Open Sans Light" panose="020B0606030504020204" pitchFamily="34" charset="0"/>
-                <a:cs typeface="Open Sans Light" panose="020B0606030504020204" pitchFamily="34" charset="0"/>
-              </a:rPr>
-              <a:t>repr</a:t>
-            </a:r>
-            <a:r>
-              <a:rPr lang="en-US" dirty="0">
-                <a:latin typeface="Open Sans Light" panose="020B0606030504020204" pitchFamily="34" charset="0"/>
-                <a:ea typeface="Open Sans Light" panose="020B0606030504020204" pitchFamily="34" charset="0"/>
-                <a:cs typeface="Open Sans Light" panose="020B0606030504020204" pitchFamily="34" charset="0"/>
-              </a:rPr>
-              <a:t>__ method, length, etc.</a:t>
-            </a:r>
-          </a:p>
-          <a:p>
-            <a:r>
-              <a:rPr lang="en-US" dirty="0">
-                <a:latin typeface="Open Sans Light" panose="020B0606030504020204" pitchFamily="34" charset="0"/>
-                <a:ea typeface="Open Sans Light" panose="020B0606030504020204" pitchFamily="34" charset="0"/>
-                <a:cs typeface="Open Sans Light" panose="020B0606030504020204" pitchFamily="34" charset="0"/>
-              </a:rPr>
-              <a:t> Use an empty  tuple for clarity / easier than None.</a:t>
-            </a:r>
-          </a:p>
-          <a:p>
-            <a:pPr lvl="1"/>
-            <a:r>
-              <a:rPr lang="en-US" dirty="0">
-                <a:latin typeface="Open Sans Light" panose="020B0606030504020204" pitchFamily="34" charset="0"/>
-                <a:ea typeface="Open Sans Light" panose="020B0606030504020204" pitchFamily="34" charset="0"/>
-                <a:cs typeface="Open Sans Light" panose="020B0606030504020204" pitchFamily="34" charset="0"/>
-              </a:rPr>
-              <a:t> () has lots of useful methods defined, like </a:t>
-            </a:r>
-            <a:r>
-              <a:rPr lang="en-US" dirty="0" err="1">
-                <a:latin typeface="Open Sans Light" panose="020B0606030504020204" pitchFamily="34" charset="0"/>
-                <a:ea typeface="Open Sans Light" panose="020B0606030504020204" pitchFamily="34" charset="0"/>
-                <a:cs typeface="Open Sans Light" panose="020B0606030504020204" pitchFamily="34" charset="0"/>
-              </a:rPr>
-              <a:t>len</a:t>
-            </a:r>
-            <a:r>
-              <a:rPr lang="en-US">
-                <a:latin typeface="Open Sans Light" panose="020B0606030504020204" pitchFamily="34" charset="0"/>
-                <a:ea typeface="Open Sans Light" panose="020B0606030504020204" pitchFamily="34" charset="0"/>
-                <a:cs typeface="Open Sans Light" panose="020B0606030504020204" pitchFamily="34" charset="0"/>
-              </a:rPr>
-              <a:t>()</a:t>
-            </a:r>
-            <a:endParaRPr lang="en-US" dirty="0">
-              <a:latin typeface="Open Sans Light" panose="020B0606030504020204" pitchFamily="34" charset="0"/>
-              <a:ea typeface="Open Sans Light" panose="020B0606030504020204" pitchFamily="34" charset="0"/>
-              <a:cs typeface="Open Sans Light" panose="020B0606030504020204" pitchFamily="34" charset="0"/>
-            </a:endParaRPr>
-          </a:p>
-          <a:p>
-            <a:pPr marL="0" indent="0">
-              <a:buNone/>
-            </a:pPr>
-            <a:endParaRPr lang="en-US" dirty="0">
-              <a:latin typeface="Source Code Pro" panose="020B0509030403020204" pitchFamily="49" charset="77"/>
-            </a:endParaRPr>
-          </a:p>
-        </p:txBody>
-      </p:sp>
-    </p:spTree>
-    <p:extLst>
-      <p:ext uri="{BB962C8B-B14F-4D97-AF65-F5344CB8AC3E}">
-        <p14:creationId xmlns:p14="http://schemas.microsoft.com/office/powerpoint/2010/main" val="1748222650"/>
-      </p:ext>
-    </p:extLst>
-  </p:cSld>
-  <p:clrMapOvr>
-    <a:masterClrMapping/>
-  </p:clrMapOvr>
-</p:sld>
-</file>
-
-<file path=ppt/slides/slide12.xml><?xml version="1.0" encoding="utf-8"?>
 <p:sld xmlns:a="http://schemas.openxmlformats.org/drawingml/2006/main" xmlns:r="http://schemas.openxmlformats.org/officeDocument/2006/relationships" xmlns:p="http://schemas.openxmlformats.org/presentationml/2006/main">
   <p:cSld>
     <p:spTree>
@@ -10616,7 +10192,7 @@
 </p:sld>
 </file>
 
-<file path=ppt/slides/slide13.xml><?xml version="1.0" encoding="utf-8"?>
+<file path=ppt/slides/slide11.xml><?xml version="1.0" encoding="utf-8"?>
 <p:sld xmlns:a="http://schemas.openxmlformats.org/drawingml/2006/main" xmlns:r="http://schemas.openxmlformats.org/officeDocument/2006/relationships" xmlns:p="http://schemas.openxmlformats.org/presentationml/2006/main">
   <p:cSld>
     <p:spTree>
@@ -11373,7 +10949,7 @@
 </p:sld>
 </file>
 
-<file path=ppt/slides/slide14.xml><?xml version="1.0" encoding="utf-8"?>
+<file path=ppt/slides/slide12.xml><?xml version="1.0" encoding="utf-8"?>
 <p:sld xmlns:a="http://schemas.openxmlformats.org/drawingml/2006/main" xmlns:r="http://schemas.openxmlformats.org/officeDocument/2006/relationships" xmlns:p="http://schemas.openxmlformats.org/presentationml/2006/main">
   <p:cSld>
     <p:spTree>
@@ -11486,7 +11062,7 @@
 </p:sld>
 </file>
 
-<file path=ppt/slides/slide15.xml><?xml version="1.0" encoding="utf-8"?>
+<file path=ppt/slides/slide13.xml><?xml version="1.0" encoding="utf-8"?>
 <p:sld xmlns:a="http://schemas.openxmlformats.org/drawingml/2006/main" xmlns:r="http://schemas.openxmlformats.org/officeDocument/2006/relationships" xmlns:p="http://schemas.openxmlformats.org/presentationml/2006/main">
   <p:cSld>
     <p:spTree>
@@ -11966,7 +11542,7 @@
 </p:sld>
 </file>
 
-<file path=ppt/slides/slide16.xml><?xml version="1.0" encoding="utf-8"?>
+<file path=ppt/slides/slide14.xml><?xml version="1.0" encoding="utf-8"?>
 <p:sld xmlns:a="http://schemas.openxmlformats.org/drawingml/2006/main" xmlns:r="http://schemas.openxmlformats.org/officeDocument/2006/relationships" xmlns:p="http://schemas.openxmlformats.org/presentationml/2006/main">
   <p:cSld>
     <p:spTree>
@@ -12377,7 +11953,7 @@
 </p:sld>
 </file>
 
-<file path=ppt/slides/slide17.xml><?xml version="1.0" encoding="utf-8"?>
+<file path=ppt/slides/slide15.xml><?xml version="1.0" encoding="utf-8"?>
 <p:sld xmlns:a="http://schemas.openxmlformats.org/drawingml/2006/main" xmlns:r="http://schemas.openxmlformats.org/officeDocument/2006/relationships" xmlns:p="http://schemas.openxmlformats.org/presentationml/2006/main">
   <p:cSld>
     <p:spTree>
@@ -12412,12 +11988,77 @@
         </p:nvSpPr>
         <p:spPr/>
         <p:txBody>
-          <a:bodyPr/>
+          <a:bodyPr>
+            <a:normAutofit fontScale="90000"/>
+          </a:bodyPr>
           <a:lstStyle/>
           <a:p>
             <a:r>
               <a:rPr lang="en-US" dirty="0"/>
-              <a:t>Demo – See the Notebook</a:t>
+              <a:t>Demo – See the Notebook (https://datahub.berkeley.edu/)</a:t>
+            </a:r>
+          </a:p>
+        </p:txBody>
+      </p:sp>
+      <p:sp>
+        <p:nvSpPr>
+          <p:cNvPr id="3" name="TextBox 2">
+            <a:extLst>
+              <a:ext uri="{FF2B5EF4-FFF2-40B4-BE49-F238E27FC236}">
+                <a16:creationId xmlns:a16="http://schemas.microsoft.com/office/drawing/2014/main" id="{618870D4-2200-0379-60FD-7F6CF071FF39}"/>
+              </a:ext>
+            </a:extLst>
+          </p:cNvPr>
+          <p:cNvSpPr txBox="1"/>
+          <p:nvPr/>
+        </p:nvSpPr>
+        <p:spPr>
+          <a:xfrm>
+            <a:off x="762000" y="5181600"/>
+            <a:ext cx="7848600" cy="1200329"/>
+          </a:xfrm>
+          <a:prstGeom prst="rect">
+            <a:avLst/>
+          </a:prstGeom>
+          <a:noFill/>
+        </p:spPr>
+        <p:txBody>
+          <a:bodyPr wrap="square" rtlCol="0">
+            <a:spAutoFit/>
+          </a:bodyPr>
+          <a:lstStyle/>
+          <a:p>
+            <a:r>
+              <a:rPr lang="en-US" b="1" dirty="0"/>
+              <a:t>Important</a:t>
+            </a:r>
+            <a:r>
+              <a:rPr lang="en-US" dirty="0"/>
+              <a:t>: although this demo shows overriding the __</a:t>
+            </a:r>
+            <a:r>
+              <a:rPr lang="en-US" dirty="0" err="1"/>
+              <a:t>setattr</a:t>
+            </a:r>
+            <a:r>
+              <a:rPr lang="en-US" dirty="0"/>
+              <a:t>__ magic methods, in this class we will not test you on this on exams, as overriding __</a:t>
+            </a:r>
+            <a:r>
+              <a:rPr lang="en-US" dirty="0" err="1"/>
+              <a:t>getattr</a:t>
+            </a:r>
+            <a:r>
+              <a:rPr lang="en-US" dirty="0"/>
+              <a:t>__ and __</a:t>
+            </a:r>
+            <a:r>
+              <a:rPr lang="en-US" dirty="0" err="1"/>
+              <a:t>setattr</a:t>
+            </a:r>
+            <a:r>
+              <a:rPr lang="en-US" dirty="0"/>
+              <a:t>__ is quite complicated and out of scope for this course. But, it's neat to see.</a:t>
             </a:r>
           </a:p>
         </p:txBody>
@@ -12435,7 +12076,7 @@
 </p:sld>
 </file>
 
-<file path=ppt/slides/slide18.xml><?xml version="1.0" encoding="utf-8"?>
+<file path=ppt/slides/slide16.xml><?xml version="1.0" encoding="utf-8"?>
 <p:sld xmlns:a="http://schemas.openxmlformats.org/drawingml/2006/main" xmlns:r="http://schemas.openxmlformats.org/officeDocument/2006/relationships" xmlns:p="http://schemas.openxmlformats.org/presentationml/2006/main">
   <p:cSld>
     <p:spTree>
@@ -12598,7 +12239,7 @@
 </p:sld>
 </file>
 
-<file path=ppt/slides/slide19.xml><?xml version="1.0" encoding="utf-8"?>
+<file path=ppt/slides/slide17.xml><?xml version="1.0" encoding="utf-8"?>
 <p:sld xmlns:a="http://schemas.openxmlformats.org/drawingml/2006/main" xmlns:r="http://schemas.openxmlformats.org/officeDocument/2006/relationships" xmlns:p="http://schemas.openxmlformats.org/presentationml/2006/main">
   <p:cSld>
     <p:spTree>
@@ -13043,146 +12684,7 @@
 </p:sld>
 </file>
 
-<file path=ppt/slides/slide2.xml><?xml version="1.0" encoding="utf-8"?>
-<p:sld xmlns:a="http://schemas.openxmlformats.org/drawingml/2006/main" xmlns:r="http://schemas.openxmlformats.org/officeDocument/2006/relationships" xmlns:p="http://schemas.openxmlformats.org/presentationml/2006/main">
-  <p:cSld>
-    <p:spTree>
-      <p:nvGrpSpPr>
-        <p:cNvPr id="1" name=""/>
-        <p:cNvGrpSpPr/>
-        <p:nvPr/>
-      </p:nvGrpSpPr>
-      <p:grpSpPr>
-        <a:xfrm>
-          <a:off x="0" y="0"/>
-          <a:ext cx="0" cy="0"/>
-          <a:chOff x="0" y="0"/>
-          <a:chExt cx="0" cy="0"/>
-        </a:xfrm>
-      </p:grpSpPr>
-      <p:sp>
-        <p:nvSpPr>
-          <p:cNvPr id="2" name="Title 1">
-            <a:extLst>
-              <a:ext uri="{FF2B5EF4-FFF2-40B4-BE49-F238E27FC236}">
-                <a16:creationId xmlns:a16="http://schemas.microsoft.com/office/drawing/2014/main" id="{2427B912-B145-B09F-043F-1E1CAD7DC770}"/>
-              </a:ext>
-            </a:extLst>
-          </p:cNvPr>
-          <p:cNvSpPr>
-            <a:spLocks noGrp="1"/>
-          </p:cNvSpPr>
-          <p:nvPr>
-            <p:ph type="title"/>
-          </p:nvPr>
-        </p:nvSpPr>
-        <p:spPr/>
-        <p:txBody>
-          <a:bodyPr/>
-          <a:lstStyle/>
-          <a:p>
-            <a:r>
-              <a:rPr lang="en-US" dirty="0"/>
-              <a:t>Announcements</a:t>
-            </a:r>
-          </a:p>
-        </p:txBody>
-      </p:sp>
-      <p:sp>
-        <p:nvSpPr>
-          <p:cNvPr id="3" name="Content Placeholder 2">
-            <a:extLst>
-              <a:ext uri="{FF2B5EF4-FFF2-40B4-BE49-F238E27FC236}">
-                <a16:creationId xmlns:a16="http://schemas.microsoft.com/office/drawing/2014/main" id="{EFA1BC5A-2BE5-FB5E-047B-16F2DB0CAA77}"/>
-              </a:ext>
-            </a:extLst>
-          </p:cNvPr>
-          <p:cNvSpPr>
-            <a:spLocks noGrp="1"/>
-          </p:cNvSpPr>
-          <p:nvPr>
-            <p:ph idx="1"/>
-          </p:nvPr>
-        </p:nvSpPr>
-        <p:spPr>
-          <a:xfrm>
-            <a:off x="533400" y="1066800"/>
-            <a:ext cx="9448800" cy="5257800"/>
-          </a:xfrm>
-        </p:spPr>
-        <p:txBody>
-          <a:bodyPr/>
-          <a:lstStyle/>
-          <a:p>
-            <a:pPr marL="0" indent="0">
-              <a:buNone/>
-            </a:pPr>
-            <a:r>
-              <a:rPr lang="en-US" b="1" dirty="0"/>
-              <a:t>A note on the midterm… </a:t>
-            </a:r>
-          </a:p>
-          <a:p>
-            <a:r>
-              <a:rPr lang="en-US" dirty="0"/>
-              <a:t>Staff aiming to release midterm grades by end of day tomorrow (Tue 3/19) but no guarantees</a:t>
-            </a:r>
-          </a:p>
-          <a:p>
-            <a:r>
-              <a:rPr lang="en-US" dirty="0"/>
-              <a:t>Your grades don’t define you. Seriously!</a:t>
-            </a:r>
-          </a:p>
-          <a:p>
-            <a:pPr lvl="1"/>
-            <a:r>
-              <a:rPr lang="en-US" dirty="0"/>
-              <a:t>From </a:t>
-            </a:r>
-            <a:r>
-              <a:rPr lang="en-US" dirty="0" err="1"/>
-              <a:t>Berkeleytime</a:t>
-            </a:r>
-            <a:r>
-              <a:rPr lang="en-US" dirty="0"/>
-              <a:t> historical data, ~40% of students get an A- or higher</a:t>
-            </a:r>
-          </a:p>
-          <a:p>
-            <a:r>
-              <a:rPr lang="en-US" dirty="0"/>
-              <a:t>Focus on learning the material, stay on track, don’t lose sight of the big picture</a:t>
-            </a:r>
-          </a:p>
-          <a:p>
-            <a:r>
-              <a:rPr lang="en-US" dirty="0"/>
-              <a:t>If you need support or have questions/concerns please reach out </a:t>
-            </a:r>
-            <a:r>
-              <a:rPr lang="en-US" dirty="0">
-                <a:sym typeface="Wingdings" pitchFamily="2" charset="2"/>
-              </a:rPr>
-              <a:t>:D</a:t>
-            </a:r>
-          </a:p>
-        </p:txBody>
-      </p:sp>
-    </p:spTree>
-    <p:extLst>
-      <p:ext uri="{BB962C8B-B14F-4D97-AF65-F5344CB8AC3E}">
-        <p14:creationId xmlns:p14="http://schemas.microsoft.com/office/powerpoint/2010/main" val="2654583001"/>
-      </p:ext>
-    </p:extLst>
-  </p:cSld>
-  <p:clrMapOvr>
-    <a:masterClrMapping/>
-  </p:clrMapOvr>
-</p:sld>
-</file>
-
-<file path=ppt/slides/slide20.xml><?xml version="1.0" encoding="utf-8"?>
+<file path=ppt/slides/slide18.xml><?xml version="1.0" encoding="utf-8"?>
 <p:sld xmlns:a="http://schemas.openxmlformats.org/drawingml/2006/main" xmlns:r="http://schemas.openxmlformats.org/officeDocument/2006/relationships" xmlns:p="http://schemas.openxmlformats.org/presentationml/2006/main">
   <p:cSld>
     <p:spTree>
@@ -13224,7 +12726,7 @@
           <a:p>
             <a:r>
               <a:rPr lang="en-US" dirty="0"/>
-              <a:t>                  Lists                      vs                 Linked Lists</a:t>
+              <a:t>Lists                      vs                 Linked Lists</a:t>
             </a:r>
           </a:p>
         </p:txBody>
@@ -13374,14 +12876,14 @@
           </a:ln>
           <a:extLst>
             <a:ext uri="{909E8E84-426E-40dd-AFC4-6F175D3DCCD1}">
-              <a14:hiddenFill xmlns:a14="http://schemas.microsoft.com/office/drawing/2010/main" xmlns="">
+              <a14:hiddenFill xmlns="" xmlns:a14="http://schemas.microsoft.com/office/drawing/2010/main">
                 <a:solidFill>
                   <a:srgbClr val="FFFFFF"/>
                 </a:solidFill>
               </a14:hiddenFill>
             </a:ext>
             <a:ext uri="{91240B29-F687-4f45-9708-019B960494DF}">
-              <a14:hiddenLine xmlns:a14="http://schemas.microsoft.com/office/drawing/2010/main" xmlns="" w="9525">
+              <a14:hiddenLine xmlns="" xmlns:a14="http://schemas.microsoft.com/office/drawing/2010/main" w="9525">
                 <a:solidFill>
                   <a:srgbClr val="000000"/>
                 </a:solidFill>
@@ -13391,7 +12893,7 @@
               </a14:hiddenLine>
             </a:ext>
             <a:ext uri="{FAA26D3D-D897-4be2-8F04-BA451C77F1D7}">
-              <ma14:placeholderFlag xmlns:ma14="http://schemas.microsoft.com/office/mac/drawingml/2011/main" xmlns="" val="1"/>
+              <ma14:placeholderFlag xmlns="" xmlns:ma14="http://schemas.microsoft.com/office/mac/drawingml/2011/main" val="1"/>
             </a:ext>
           </a:extLst>
         </p:spPr>
@@ -14213,131 +13715,7 @@
 </p:sld>
 </file>
 
-<file path=ppt/slides/slide21.xml><?xml version="1.0" encoding="utf-8"?>
-<p:sld xmlns:a="http://schemas.openxmlformats.org/drawingml/2006/main" xmlns:r="http://schemas.openxmlformats.org/officeDocument/2006/relationships" xmlns:p="http://schemas.openxmlformats.org/presentationml/2006/main">
-  <p:cSld>
-    <p:spTree>
-      <p:nvGrpSpPr>
-        <p:cNvPr id="1" name=""/>
-        <p:cNvGrpSpPr/>
-        <p:nvPr/>
-      </p:nvGrpSpPr>
-      <p:grpSpPr>
-        <a:xfrm>
-          <a:off x="0" y="0"/>
-          <a:ext cx="0" cy="0"/>
-          <a:chOff x="0" y="0"/>
-          <a:chExt cx="0" cy="0"/>
-        </a:xfrm>
-      </p:grpSpPr>
-      <p:sp>
-        <p:nvSpPr>
-          <p:cNvPr id="2" name="Title 1">
-            <a:extLst>
-              <a:ext uri="{FF2B5EF4-FFF2-40B4-BE49-F238E27FC236}">
-                <a16:creationId xmlns:a16="http://schemas.microsoft.com/office/drawing/2014/main" id="{A9944818-81C8-ADE7-1763-A9C61CFBCE13}"/>
-              </a:ext>
-            </a:extLst>
-          </p:cNvPr>
-          <p:cNvSpPr>
-            <a:spLocks noGrp="1"/>
-          </p:cNvSpPr>
-          <p:nvPr>
-            <p:ph type="title"/>
-          </p:nvPr>
-        </p:nvSpPr>
-        <p:spPr/>
-        <p:txBody>
-          <a:bodyPr/>
-          <a:lstStyle/>
-          <a:p>
-            <a:r>
-              <a:rPr lang="en-US" dirty="0"/>
-              <a:t>Please send me your feedback (anonymous) :D</a:t>
-            </a:r>
-          </a:p>
-        </p:txBody>
-      </p:sp>
-      <p:sp>
-        <p:nvSpPr>
-          <p:cNvPr id="3" name="Content Placeholder 2">
-            <a:extLst>
-              <a:ext uri="{FF2B5EF4-FFF2-40B4-BE49-F238E27FC236}">
-                <a16:creationId xmlns:a16="http://schemas.microsoft.com/office/drawing/2014/main" id="{4A28017E-C1CB-816F-4FEE-2C4DABBD895B}"/>
-              </a:ext>
-            </a:extLst>
-          </p:cNvPr>
-          <p:cNvSpPr>
-            <a:spLocks noGrp="1"/>
-          </p:cNvSpPr>
-          <p:nvPr>
-            <p:ph idx="1"/>
-          </p:nvPr>
-        </p:nvSpPr>
-        <p:spPr/>
-        <p:txBody>
-          <a:bodyPr/>
-          <a:lstStyle/>
-          <a:p>
-            <a:pPr marL="0" indent="0">
-              <a:buNone/>
-            </a:pPr>
-            <a:r>
-              <a:rPr lang="en-US" sz="4000" i="0" u="sng" dirty="0">
-                <a:solidFill>
-                  <a:srgbClr val="1155CC"/>
-                </a:solidFill>
-                <a:effectLst/>
-                <a:hlinkClick r:id="rId2"/>
-              </a:rPr>
-              <a:t>https://go.c88c.org/rebecca-lecture</a:t>
-            </a:r>
-            <a:endParaRPr lang="en-US" sz="4000" dirty="0"/>
-          </a:p>
-        </p:txBody>
-      </p:sp>
-      <p:sp>
-        <p:nvSpPr>
-          <p:cNvPr id="4" name="Footer Placeholder 3">
-            <a:extLst>
-              <a:ext uri="{FF2B5EF4-FFF2-40B4-BE49-F238E27FC236}">
-                <a16:creationId xmlns:a16="http://schemas.microsoft.com/office/drawing/2014/main" id="{84B2A0E6-FDC2-739F-1D37-87ADC945A880}"/>
-              </a:ext>
-            </a:extLst>
-          </p:cNvPr>
-          <p:cNvSpPr>
-            <a:spLocks noGrp="1"/>
-          </p:cNvSpPr>
-          <p:nvPr>
-            <p:ph type="ftr" sz="quarter" idx="10"/>
-          </p:nvPr>
-        </p:nvSpPr>
-        <p:spPr/>
-        <p:txBody>
-          <a:bodyPr/>
-          <a:lstStyle/>
-          <a:p>
-            <a:r>
-              <a:rPr lang="en-US"/>
-              <a:t>Michael Ball | UC Berkeley | https://c88c.org | © CC BY-NC-SA</a:t>
-            </a:r>
-          </a:p>
-        </p:txBody>
-      </p:sp>
-    </p:spTree>
-    <p:extLst>
-      <p:ext uri="{BB962C8B-B14F-4D97-AF65-F5344CB8AC3E}">
-        <p14:creationId xmlns:p14="http://schemas.microsoft.com/office/powerpoint/2010/main" val="1389253246"/>
-      </p:ext>
-    </p:extLst>
-  </p:cSld>
-  <p:clrMapOvr>
-    <a:masterClrMapping/>
-  </p:clrMapOvr>
-</p:sld>
-</file>
-
-<file path=ppt/slides/slide22.xml><?xml version="1.0" encoding="utf-8"?>
+<file path=ppt/slides/slide19.xml><?xml version="1.0" encoding="utf-8"?>
 <p:sld xmlns:a="http://schemas.openxmlformats.org/drawingml/2006/main" xmlns:r="http://schemas.openxmlformats.org/officeDocument/2006/relationships" xmlns:p="http://schemas.openxmlformats.org/presentationml/2006/main">
   <p:cSld>
     <p:spTree>
@@ -14480,7 +13858,7 @@
 </p:sld>
 </file>
 
-<file path=ppt/slides/slide3.xml><?xml version="1.0" encoding="utf-8"?>
+<file path=ppt/slides/slide2.xml><?xml version="1.0" encoding="utf-8"?>
 <p:sld xmlns:a="http://schemas.openxmlformats.org/drawingml/2006/main" xmlns:r="http://schemas.openxmlformats.org/officeDocument/2006/relationships" xmlns:p="http://schemas.openxmlformats.org/presentationml/2006/main">
   <p:cSld>
     <p:spTree>
@@ -14544,57 +13922,47 @@
         <p:spPr>
           <a:xfrm>
             <a:off x="533400" y="1066800"/>
-            <a:ext cx="9448800" cy="5257800"/>
+            <a:ext cx="11277600" cy="5257800"/>
           </a:xfrm>
         </p:spPr>
         <p:txBody>
           <a:bodyPr/>
           <a:lstStyle/>
           <a:p>
-            <a:pPr marL="0" indent="0">
-              <a:buNone/>
+            <a:pPr>
+              <a:buFontTx/>
+              <a:buChar char="-"/>
             </a:pPr>
             <a:r>
-              <a:rPr lang="en-US" b="1" dirty="0">
-                <a:sym typeface="Wingdings" pitchFamily="2" charset="2"/>
-              </a:rPr>
-              <a:t>Lab 8 and HW 8</a:t>
-            </a:r>
-          </a:p>
-          <a:p>
-            <a:r>
-              <a:rPr lang="en-US" dirty="0">
-                <a:sym typeface="Wingdings" pitchFamily="2" charset="2"/>
-              </a:rPr>
-              <a:t>Released this week</a:t>
-            </a:r>
-          </a:p>
-          <a:p>
-            <a:r>
-              <a:rPr lang="en-US" dirty="0">
-                <a:sym typeface="Wingdings" pitchFamily="2" charset="2"/>
-              </a:rPr>
-              <a:t>Due the week we come back from spring break</a:t>
-            </a:r>
-          </a:p>
-          <a:p>
-            <a:r>
-              <a:rPr lang="en-US" dirty="0">
-                <a:sym typeface="Wingdings" pitchFamily="2" charset="2"/>
-              </a:rPr>
-              <a:t>Nothing due this week 🎉</a:t>
-            </a:r>
-            <a:endParaRPr lang="en-US" dirty="0"/>
-          </a:p>
-          <a:p>
-            <a:endParaRPr lang="en-US" dirty="0"/>
+              <a:rPr lang="en-US" b="1" dirty="0"/>
+              <a:t>Midterm: some people are still taking the exam today (Thursday), so please don't discuss it until Friday</a:t>
+            </a:r>
+          </a:p>
+          <a:p>
+            <a:pPr>
+              <a:buFontTx/>
+              <a:buChar char="-"/>
+            </a:pPr>
+            <a:r>
+              <a:rPr lang="en-US" b="1" dirty="0"/>
+              <a:t> Project02 ("Ants") is out! Also a partner project like Project01 (can work alone)</a:t>
+            </a:r>
+          </a:p>
+          <a:p>
+            <a:pPr>
+              <a:buFontTx/>
+              <a:buChar char="-"/>
+            </a:pPr>
+            <a:endParaRPr lang="en-US" dirty="0">
+              <a:sym typeface="Wingdings" pitchFamily="2" charset="2"/>
+            </a:endParaRPr>
           </a:p>
         </p:txBody>
       </p:sp>
     </p:spTree>
     <p:extLst>
       <p:ext uri="{BB962C8B-B14F-4D97-AF65-F5344CB8AC3E}">
-        <p14:creationId xmlns:p14="http://schemas.microsoft.com/office/powerpoint/2010/main" val="3247116709"/>
+        <p14:creationId xmlns:p14="http://schemas.microsoft.com/office/powerpoint/2010/main" val="2654583001"/>
       </p:ext>
     </p:extLst>
   </p:cSld>
@@ -14604,218 +13972,7 @@
 </p:sld>
 </file>
 
-<file path=ppt/slides/slide4.xml><?xml version="1.0" encoding="utf-8"?>
-<p:sld xmlns:a="http://schemas.openxmlformats.org/drawingml/2006/main" xmlns:r="http://schemas.openxmlformats.org/officeDocument/2006/relationships" xmlns:p="http://schemas.openxmlformats.org/presentationml/2006/main">
-  <p:cSld>
-    <p:spTree>
-      <p:nvGrpSpPr>
-        <p:cNvPr id="1" name=""/>
-        <p:cNvGrpSpPr/>
-        <p:nvPr/>
-      </p:nvGrpSpPr>
-      <p:grpSpPr>
-        <a:xfrm>
-          <a:off x="0" y="0"/>
-          <a:ext cx="0" cy="0"/>
-          <a:chOff x="0" y="0"/>
-          <a:chExt cx="0" cy="0"/>
-        </a:xfrm>
-      </p:grpSpPr>
-      <p:sp>
-        <p:nvSpPr>
-          <p:cNvPr id="2" name="Title 1">
-            <a:extLst>
-              <a:ext uri="{FF2B5EF4-FFF2-40B4-BE49-F238E27FC236}">
-                <a16:creationId xmlns:a16="http://schemas.microsoft.com/office/drawing/2014/main" id="{0770BB55-E7C7-E7CF-216D-41BE77881FFA}"/>
-              </a:ext>
-            </a:extLst>
-          </p:cNvPr>
-          <p:cNvSpPr>
-            <a:spLocks noGrp="1"/>
-          </p:cNvSpPr>
-          <p:nvPr>
-            <p:ph type="title"/>
-          </p:nvPr>
-        </p:nvSpPr>
-        <p:spPr/>
-        <p:txBody>
-          <a:bodyPr wrap="square" anchor="ctr">
-            <a:normAutofit/>
-          </a:bodyPr>
-          <a:lstStyle/>
-          <a:p>
-            <a:r>
-              <a:rPr lang="en-US" dirty="0"/>
-              <a:t>Fun Video: CGP Grey Rock Paper Scissors</a:t>
-            </a:r>
-          </a:p>
-        </p:txBody>
-      </p:sp>
-      <p:sp>
-        <p:nvSpPr>
-          <p:cNvPr id="11" name="Content Placeholder 3">
-            <a:extLst>
-              <a:ext uri="{FF2B5EF4-FFF2-40B4-BE49-F238E27FC236}">
-                <a16:creationId xmlns:a16="http://schemas.microsoft.com/office/drawing/2014/main" id="{F8612DA0-AB71-A1FF-A466-DBC1CB999CA7}"/>
-              </a:ext>
-            </a:extLst>
-          </p:cNvPr>
-          <p:cNvSpPr>
-            <a:spLocks noGrp="1"/>
-          </p:cNvSpPr>
-          <p:nvPr>
-            <p:ph sz="half" idx="1"/>
-          </p:nvPr>
-        </p:nvSpPr>
-        <p:spPr>
-          <a:xfrm>
-            <a:off x="533400" y="1066800"/>
-            <a:ext cx="5715000" cy="5257800"/>
-          </a:xfrm>
-        </p:spPr>
-        <p:txBody>
-          <a:bodyPr wrap="square" anchor="t">
-            <a:normAutofit/>
-          </a:bodyPr>
-          <a:lstStyle/>
-          <a:p>
-            <a:r>
-              <a:rPr lang="en-US" dirty="0"/>
-              <a:t> How many rounds of Rock Paper Scissors is a 1 in 1,000,000,000 chance of winning?</a:t>
-            </a:r>
-          </a:p>
-          <a:p>
-            <a:r>
-              <a:rPr lang="en-US" dirty="0"/>
-              <a:t> Each video leads to another set of videos.</a:t>
-            </a:r>
-          </a:p>
-          <a:p>
-            <a:r>
-              <a:rPr lang="en-US" dirty="0"/>
-              <a:t> This is technically a </a:t>
-            </a:r>
-            <a:r>
-              <a:rPr lang="en-US" i="1" dirty="0"/>
-              <a:t>tree</a:t>
-            </a:r>
-            <a:r>
-              <a:rPr lang="en-US" dirty="0"/>
-              <a:t>, but we'll come back to that later.</a:t>
-            </a:r>
-          </a:p>
-        </p:txBody>
-      </p:sp>
-      <p:sp>
-        <p:nvSpPr>
-          <p:cNvPr id="4" name="Footer Placeholder 3">
-            <a:extLst>
-              <a:ext uri="{FF2B5EF4-FFF2-40B4-BE49-F238E27FC236}">
-                <a16:creationId xmlns:a16="http://schemas.microsoft.com/office/drawing/2014/main" id="{87CDDE88-5096-447E-886A-8E55A3818B53}"/>
-              </a:ext>
-            </a:extLst>
-          </p:cNvPr>
-          <p:cNvSpPr>
-            <a:spLocks noGrp="1"/>
-          </p:cNvSpPr>
-          <p:nvPr>
-            <p:ph type="ftr" sz="quarter" idx="10"/>
-          </p:nvPr>
-        </p:nvSpPr>
-        <p:spPr/>
-        <p:txBody>
-          <a:bodyPr anchor="ctr">
-            <a:normAutofit fontScale="92500" lnSpcReduction="10000"/>
-          </a:bodyPr>
-          <a:lstStyle/>
-          <a:p>
-            <a:pPr>
-              <a:spcAft>
-                <a:spcPts val="600"/>
-              </a:spcAft>
-            </a:pPr>
-            <a:r>
-              <a:rPr lang="en-US"/>
-              <a:t>Michael Ball | UC Berkeley | https://c88c.org | © CC BY-NC-SA</a:t>
-            </a:r>
-          </a:p>
-        </p:txBody>
-      </p:sp>
-      <p:pic>
-        <p:nvPicPr>
-          <p:cNvPr id="8" name="Picture 7" descr="A screen shot of a video game&#10;&#10;Description automatically generated">
-            <a:extLst>
-              <a:ext uri="{FF2B5EF4-FFF2-40B4-BE49-F238E27FC236}">
-                <a16:creationId xmlns:a16="http://schemas.microsoft.com/office/drawing/2014/main" id="{1AB62EE1-94A9-371E-FCB9-EECEF255F79D}"/>
-              </a:ext>
-            </a:extLst>
-          </p:cNvPr>
-          <p:cNvPicPr>
-            <a:picLocks noChangeAspect="1"/>
-          </p:cNvPicPr>
-          <p:nvPr/>
-        </p:nvPicPr>
-        <p:blipFill>
-          <a:blip r:embed="rId2"/>
-          <a:stretch>
-            <a:fillRect/>
-          </a:stretch>
-        </p:blipFill>
-        <p:spPr>
-          <a:xfrm>
-            <a:off x="502227" y="3044192"/>
-            <a:ext cx="5334000" cy="3347084"/>
-          </a:xfrm>
-          <a:prstGeom prst="rect">
-            <a:avLst/>
-          </a:prstGeom>
-          <a:noFill/>
-        </p:spPr>
-      </p:pic>
-      <p:pic>
-        <p:nvPicPr>
-          <p:cNvPr id="13" name="Picture 12" descr="A screenshot of a video game&#10;&#10;Description automatically generated">
-            <a:extLst>
-              <a:ext uri="{FF2B5EF4-FFF2-40B4-BE49-F238E27FC236}">
-                <a16:creationId xmlns:a16="http://schemas.microsoft.com/office/drawing/2014/main" id="{5101BA82-ECDB-A26D-628E-FA31D1449A54}"/>
-              </a:ext>
-            </a:extLst>
-          </p:cNvPr>
-          <p:cNvPicPr>
-            <a:picLocks noChangeAspect="1"/>
-          </p:cNvPicPr>
-          <p:nvPr/>
-        </p:nvPicPr>
-        <p:blipFill>
-          <a:blip r:embed="rId3"/>
-          <a:stretch>
-            <a:fillRect/>
-          </a:stretch>
-        </p:blipFill>
-        <p:spPr>
-          <a:xfrm>
-            <a:off x="5836227" y="3064974"/>
-            <a:ext cx="3809999" cy="2418758"/>
-          </a:xfrm>
-          <a:prstGeom prst="rect">
-            <a:avLst/>
-          </a:prstGeom>
-        </p:spPr>
-      </p:pic>
-    </p:spTree>
-    <p:extLst>
-      <p:ext uri="{BB962C8B-B14F-4D97-AF65-F5344CB8AC3E}">
-        <p14:creationId xmlns:p14="http://schemas.microsoft.com/office/powerpoint/2010/main" val="506966414"/>
-      </p:ext>
-    </p:extLst>
-  </p:cSld>
-  <p:clrMapOvr>
-    <a:masterClrMapping/>
-  </p:clrMapOvr>
-</p:sld>
-</file>
-
-<file path=ppt/slides/slide5.xml><?xml version="1.0" encoding="utf-8"?>
+<file path=ppt/slides/slide3.xml><?xml version="1.0" encoding="utf-8"?>
 <p:sld xmlns:a="http://schemas.openxmlformats.org/drawingml/2006/main" xmlns:r="http://schemas.openxmlformats.org/officeDocument/2006/relationships" xmlns:p="http://schemas.openxmlformats.org/presentationml/2006/main">
   <p:cSld>
     <p:spTree>
@@ -14966,7 +14123,7 @@
 </p:sld>
 </file>
 
-<file path=ppt/slides/slide6.xml><?xml version="1.0" encoding="utf-8"?>
+<file path=ppt/slides/slide4.xml><?xml version="1.0" encoding="utf-8"?>
 <p:sld xmlns:a="http://schemas.openxmlformats.org/drawingml/2006/main" xmlns:r="http://schemas.openxmlformats.org/officeDocument/2006/relationships" xmlns:p="http://schemas.openxmlformats.org/presentationml/2006/main">
   <p:cSld>
     <p:spTree>
@@ -15109,7 +14266,7 @@
 </p:sld>
 </file>
 
-<file path=ppt/slides/slide7.xml><?xml version="1.0" encoding="utf-8"?>
+<file path=ppt/slides/slide5.xml><?xml version="1.0" encoding="utf-8"?>
 <p:sld xmlns:a="http://schemas.openxmlformats.org/drawingml/2006/main" xmlns:r="http://schemas.openxmlformats.org/officeDocument/2006/relationships" xmlns:p="http://schemas.openxmlformats.org/presentationml/2006/main">
   <p:cSld>
     <p:spTree>
@@ -15167,7 +14324,7 @@
 </p:sld>
 </file>
 
-<file path=ppt/slides/slide8.xml><?xml version="1.0" encoding="utf-8"?>
+<file path=ppt/slides/slide6.xml><?xml version="1.0" encoding="utf-8"?>
 <p:sld xmlns:a="http://schemas.openxmlformats.org/drawingml/2006/main" xmlns:r="http://schemas.openxmlformats.org/officeDocument/2006/relationships" xmlns:p="http://schemas.openxmlformats.org/presentationml/2006/main">
   <p:cSld>
     <p:spTree>
@@ -15714,7 +14871,7 @@
 </p:sld>
 </file>
 
-<file path=ppt/slides/slide9.xml><?xml version="1.0" encoding="utf-8"?>
+<file path=ppt/slides/slide7.xml><?xml version="1.0" encoding="utf-8"?>
 <p:sld xmlns:a="http://schemas.openxmlformats.org/drawingml/2006/main" xmlns:r="http://schemas.openxmlformats.org/officeDocument/2006/relationships" xmlns:p="http://schemas.openxmlformats.org/presentationml/2006/main">
   <p:cSld>
     <p:spTree>
@@ -15979,6 +15136,433 @@
     <p:extLst>
       <p:ext uri="{BB962C8B-B14F-4D97-AF65-F5344CB8AC3E}">
         <p14:creationId xmlns:p14="http://schemas.microsoft.com/office/powerpoint/2010/main" val="2773582880"/>
+      </p:ext>
+    </p:extLst>
+  </p:cSld>
+  <p:clrMapOvr>
+    <a:masterClrMapping/>
+  </p:clrMapOvr>
+</p:sld>
+</file>
+
+<file path=ppt/slides/slide8.xml><?xml version="1.0" encoding="utf-8"?>
+<p:sld xmlns:a="http://schemas.openxmlformats.org/drawingml/2006/main" xmlns:r="http://schemas.openxmlformats.org/officeDocument/2006/relationships" xmlns:p="http://schemas.openxmlformats.org/presentationml/2006/main">
+  <p:cSld>
+    <p:spTree>
+      <p:nvGrpSpPr>
+        <p:cNvPr id="1" name=""/>
+        <p:cNvGrpSpPr/>
+        <p:nvPr/>
+      </p:nvGrpSpPr>
+      <p:grpSpPr>
+        <a:xfrm>
+          <a:off x="0" y="0"/>
+          <a:ext cx="0" cy="0"/>
+          <a:chOff x="0" y="0"/>
+          <a:chExt cx="0" cy="0"/>
+        </a:xfrm>
+      </p:grpSpPr>
+      <p:sp>
+        <p:nvSpPr>
+          <p:cNvPr id="2" name="Title 1">
+            <a:extLst>
+              <a:ext uri="{FF2B5EF4-FFF2-40B4-BE49-F238E27FC236}">
+                <a16:creationId xmlns:a16="http://schemas.microsoft.com/office/drawing/2014/main" id="{2FBD1DEF-F9AE-E0EF-60F8-8CC174573B0B}"/>
+              </a:ext>
+            </a:extLst>
+          </p:cNvPr>
+          <p:cNvSpPr>
+            <a:spLocks noGrp="1"/>
+          </p:cNvSpPr>
+          <p:nvPr>
+            <p:ph type="title"/>
+          </p:nvPr>
+        </p:nvSpPr>
+        <p:spPr/>
+        <p:txBody>
+          <a:bodyPr/>
+          <a:lstStyle/>
+          <a:p>
+            <a:r>
+              <a:rPr lang="en-US" dirty="0"/>
+              <a:t>What's Needed For a Linked List?</a:t>
+            </a:r>
+          </a:p>
+        </p:txBody>
+      </p:sp>
+      <p:sp>
+        <p:nvSpPr>
+          <p:cNvPr id="3" name="Content Placeholder 2">
+            <a:extLst>
+              <a:ext uri="{FF2B5EF4-FFF2-40B4-BE49-F238E27FC236}">
+                <a16:creationId xmlns:a16="http://schemas.microsoft.com/office/drawing/2014/main" id="{832B26A4-DA85-483A-8118-58B23E105264}"/>
+              </a:ext>
+            </a:extLst>
+          </p:cNvPr>
+          <p:cNvSpPr>
+            <a:spLocks noGrp="1"/>
+          </p:cNvSpPr>
+          <p:nvPr>
+            <p:ph idx="1"/>
+          </p:nvPr>
+        </p:nvSpPr>
+        <p:spPr/>
+        <p:txBody>
+          <a:bodyPr/>
+          <a:lstStyle/>
+          <a:p>
+            <a:r>
+              <a:rPr lang="en-US" sz="2800" dirty="0">
+                <a:latin typeface="Source Code Pro" panose="020B0509030403020204" pitchFamily="49" charset="77"/>
+              </a:rPr>
+              <a:t> first</a:t>
+            </a:r>
+          </a:p>
+          <a:p>
+            <a:r>
+              <a:rPr lang="en-US" sz="2800" dirty="0">
+                <a:latin typeface="Source Code Pro" panose="020B0509030403020204" pitchFamily="49" charset="77"/>
+              </a:rPr>
+              <a:t> rest</a:t>
+            </a:r>
+          </a:p>
+          <a:p>
+            <a:r>
+              <a:rPr lang="en-US" sz="2800" dirty="0">
+                <a:latin typeface="Helvetica" pitchFamily="2" charset="0"/>
+              </a:rPr>
+              <a:t> An idea of “empty”</a:t>
+            </a:r>
+          </a:p>
+          <a:p>
+            <a:r>
+              <a:rPr lang="en-US" sz="2800" dirty="0"/>
+              <a:t> </a:t>
+            </a:r>
+            <a:r>
+              <a:rPr lang="en-US" sz="2800" b="1" dirty="0"/>
+              <a:t>Nothing else is </a:t>
+            </a:r>
+            <a:r>
+              <a:rPr lang="en-US" sz="2800" b="1" i="1" dirty="0"/>
+              <a:t>necessary</a:t>
+            </a:r>
+            <a:endParaRPr lang="en-US" sz="2800" i="1" dirty="0"/>
+          </a:p>
+          <a:p>
+            <a:r>
+              <a:rPr lang="en-US" sz="2800" dirty="0"/>
+              <a:t> </a:t>
+            </a:r>
+            <a:r>
+              <a:rPr lang="en-US" sz="2800" dirty="0">
+                <a:latin typeface="Source Code Pro" panose="020B0509030403020204" pitchFamily="49" charset="77"/>
+              </a:rPr>
+              <a:t>__</a:t>
+            </a:r>
+            <a:r>
+              <a:rPr lang="en-US" sz="2800" dirty="0" err="1">
+                <a:latin typeface="Source Code Pro" panose="020B0509030403020204" pitchFamily="49" charset="77"/>
+              </a:rPr>
+              <a:t>repr</a:t>
+            </a:r>
+            <a:r>
+              <a:rPr lang="en-US" sz="2800" dirty="0">
+                <a:latin typeface="Source Code Pro" panose="020B0509030403020204" pitchFamily="49" charset="77"/>
+              </a:rPr>
+              <a:t>__, __</a:t>
+            </a:r>
+            <a:r>
+              <a:rPr lang="en-US" sz="2800" dirty="0" err="1">
+                <a:latin typeface="Source Code Pro" panose="020B0509030403020204" pitchFamily="49" charset="77"/>
+              </a:rPr>
+              <a:t>len</a:t>
+            </a:r>
+            <a:r>
+              <a:rPr lang="en-US" sz="2800" dirty="0">
+                <a:latin typeface="Source Code Pro" panose="020B0509030403020204" pitchFamily="49" charset="77"/>
+              </a:rPr>
+              <a:t>__ </a:t>
+            </a:r>
+            <a:r>
+              <a:rPr lang="en-US" sz="2800" dirty="0"/>
+              <a:t>methods are all useful shortcuts and useful recursion practice. </a:t>
+            </a:r>
+          </a:p>
+        </p:txBody>
+      </p:sp>
+    </p:spTree>
+    <p:extLst>
+      <p:ext uri="{BB962C8B-B14F-4D97-AF65-F5344CB8AC3E}">
+        <p14:creationId xmlns:p14="http://schemas.microsoft.com/office/powerpoint/2010/main" val="731253351"/>
+      </p:ext>
+    </p:extLst>
+  </p:cSld>
+  <p:clrMapOvr>
+    <a:masterClrMapping/>
+  </p:clrMapOvr>
+</p:sld>
+</file>
+
+<file path=ppt/slides/slide9.xml><?xml version="1.0" encoding="utf-8"?>
+<p:sld xmlns:a="http://schemas.openxmlformats.org/drawingml/2006/main" xmlns:r="http://schemas.openxmlformats.org/officeDocument/2006/relationships" xmlns:p="http://schemas.openxmlformats.org/presentationml/2006/main">
+  <p:cSld>
+    <p:spTree>
+      <p:nvGrpSpPr>
+        <p:cNvPr id="1" name=""/>
+        <p:cNvGrpSpPr/>
+        <p:nvPr/>
+      </p:nvGrpSpPr>
+      <p:grpSpPr>
+        <a:xfrm>
+          <a:off x="0" y="0"/>
+          <a:ext cx="0" cy="0"/>
+          <a:chOff x="0" y="0"/>
+          <a:chExt cx="0" cy="0"/>
+        </a:xfrm>
+      </p:grpSpPr>
+      <p:sp>
+        <p:nvSpPr>
+          <p:cNvPr id="2" name="Title 1">
+            <a:extLst>
+              <a:ext uri="{FF2B5EF4-FFF2-40B4-BE49-F238E27FC236}">
+                <a16:creationId xmlns:a16="http://schemas.microsoft.com/office/drawing/2014/main" id="{A7F86FD9-07DA-5F05-5C56-E4613EB607B1}"/>
+              </a:ext>
+            </a:extLst>
+          </p:cNvPr>
+          <p:cNvSpPr>
+            <a:spLocks noGrp="1"/>
+          </p:cNvSpPr>
+          <p:nvPr>
+            <p:ph type="title"/>
+          </p:nvPr>
+        </p:nvSpPr>
+        <p:spPr/>
+        <p:txBody>
+          <a:bodyPr/>
+          <a:lstStyle/>
+          <a:p>
+            <a:r>
+              <a:rPr lang="en-US" dirty="0"/>
+              <a:t>The Link Class</a:t>
+            </a:r>
+          </a:p>
+        </p:txBody>
+      </p:sp>
+      <p:sp>
+        <p:nvSpPr>
+          <p:cNvPr id="3" name="Content Placeholder 2">
+            <a:extLst>
+              <a:ext uri="{FF2B5EF4-FFF2-40B4-BE49-F238E27FC236}">
+                <a16:creationId xmlns:a16="http://schemas.microsoft.com/office/drawing/2014/main" id="{1CB2F8BF-9A4D-2337-4D5F-66455AD4AD53}"/>
+              </a:ext>
+            </a:extLst>
+          </p:cNvPr>
+          <p:cNvSpPr>
+            <a:spLocks noGrp="1"/>
+          </p:cNvSpPr>
+          <p:nvPr>
+            <p:ph idx="1"/>
+          </p:nvPr>
+        </p:nvSpPr>
+        <p:spPr/>
+        <p:txBody>
+          <a:bodyPr/>
+          <a:lstStyle/>
+          <a:p>
+            <a:pPr marL="0" indent="0">
+              <a:buNone/>
+            </a:pPr>
+            <a:r>
+              <a:rPr lang="en-US" dirty="0">
+                <a:latin typeface="Source Code Pro" panose="020B0509030403020204" pitchFamily="49" charset="77"/>
+              </a:rPr>
+              <a:t>class Link:</a:t>
+            </a:r>
+          </a:p>
+          <a:p>
+            <a:pPr marL="0" indent="0">
+              <a:buNone/>
+            </a:pPr>
+            <a:r>
+              <a:rPr lang="en-US" dirty="0">
+                <a:latin typeface="Source Code Pro" panose="020B0509030403020204" pitchFamily="49" charset="77"/>
+              </a:rPr>
+              <a:t>    empty = ()</a:t>
+            </a:r>
+          </a:p>
+          <a:p>
+            <a:pPr marL="0" indent="0">
+              <a:buNone/>
+            </a:pPr>
+            <a:r>
+              <a:rPr lang="en-US" dirty="0">
+                <a:latin typeface="Source Code Pro" panose="020B0509030403020204" pitchFamily="49" charset="77"/>
+              </a:rPr>
+              <a:t>    def __</a:t>
+            </a:r>
+            <a:r>
+              <a:rPr lang="en-US" dirty="0" err="1">
+                <a:latin typeface="Source Code Pro" panose="020B0509030403020204" pitchFamily="49" charset="77"/>
+              </a:rPr>
+              <a:t>init</a:t>
+            </a:r>
+            <a:r>
+              <a:rPr lang="en-US" dirty="0">
+                <a:latin typeface="Source Code Pro" panose="020B0509030403020204" pitchFamily="49" charset="77"/>
+              </a:rPr>
+              <a:t>__(self, first, rest=empty):</a:t>
+            </a:r>
+          </a:p>
+          <a:p>
+            <a:pPr marL="0" indent="0">
+              <a:buNone/>
+            </a:pPr>
+            <a:r>
+              <a:rPr lang="en-US" dirty="0">
+                <a:latin typeface="Source Code Pro" panose="020B0509030403020204" pitchFamily="49" charset="77"/>
+              </a:rPr>
+              <a:t>        </a:t>
+            </a:r>
+            <a:r>
+              <a:rPr lang="en-US" dirty="0" err="1">
+                <a:latin typeface="Source Code Pro" panose="020B0509030403020204" pitchFamily="49" charset="77"/>
+              </a:rPr>
+              <a:t>self.first</a:t>
+            </a:r>
+            <a:r>
+              <a:rPr lang="en-US" dirty="0">
+                <a:latin typeface="Source Code Pro" panose="020B0509030403020204" pitchFamily="49" charset="77"/>
+              </a:rPr>
+              <a:t> = first</a:t>
+            </a:r>
+          </a:p>
+          <a:p>
+            <a:pPr marL="0" indent="0">
+              <a:buNone/>
+            </a:pPr>
+            <a:r>
+              <a:rPr lang="en-US" dirty="0">
+                <a:latin typeface="Source Code Pro" panose="020B0509030403020204" pitchFamily="49" charset="77"/>
+              </a:rPr>
+              <a:t>        </a:t>
+            </a:r>
+            <a:r>
+              <a:rPr lang="en-US" dirty="0" err="1">
+                <a:latin typeface="Source Code Pro" panose="020B0509030403020204" pitchFamily="49" charset="77"/>
+              </a:rPr>
+              <a:t>self.rest</a:t>
+            </a:r>
+            <a:r>
+              <a:rPr lang="en-US" dirty="0">
+                <a:latin typeface="Source Code Pro" panose="020B0509030403020204" pitchFamily="49" charset="77"/>
+              </a:rPr>
+              <a:t> = rest</a:t>
+            </a:r>
+          </a:p>
+          <a:p>
+            <a:pPr marL="0" indent="0">
+              <a:buNone/>
+            </a:pPr>
+            <a:endParaRPr lang="en-US" dirty="0">
+              <a:latin typeface="Source Code Pro" panose="020B0509030403020204" pitchFamily="49" charset="77"/>
+            </a:endParaRPr>
+          </a:p>
+          <a:p>
+            <a:pPr marL="0" indent="0">
+              <a:buNone/>
+            </a:pPr>
+            <a:r>
+              <a:rPr lang="en-US" dirty="0">
+                <a:latin typeface="Open Sans Light" panose="020B0606030504020204" pitchFamily="34" charset="0"/>
+                <a:ea typeface="Open Sans Light" panose="020B0606030504020204" pitchFamily="34" charset="0"/>
+                <a:cs typeface="Open Sans Light" panose="020B0606030504020204" pitchFamily="34" charset="0"/>
+              </a:rPr>
+              <a:t>That's all we need!</a:t>
+            </a:r>
+          </a:p>
+          <a:p>
+            <a:r>
+              <a:rPr lang="en-US" dirty="0">
+                <a:latin typeface="Open Sans Light" panose="020B0606030504020204" pitchFamily="34" charset="0"/>
+                <a:ea typeface="Open Sans Light" panose="020B0606030504020204" pitchFamily="34" charset="0"/>
+                <a:cs typeface="Open Sans Light" panose="020B0606030504020204" pitchFamily="34" charset="0"/>
+              </a:rPr>
+              <a:t> We can add a __</a:t>
+            </a:r>
+            <a:r>
+              <a:rPr lang="en-US" dirty="0" err="1">
+                <a:latin typeface="Open Sans Light" panose="020B0606030504020204" pitchFamily="34" charset="0"/>
+                <a:ea typeface="Open Sans Light" panose="020B0606030504020204" pitchFamily="34" charset="0"/>
+                <a:cs typeface="Open Sans Light" panose="020B0606030504020204" pitchFamily="34" charset="0"/>
+              </a:rPr>
+              <a:t>repr</a:t>
+            </a:r>
+            <a:r>
+              <a:rPr lang="en-US" dirty="0">
+                <a:latin typeface="Open Sans Light" panose="020B0606030504020204" pitchFamily="34" charset="0"/>
+                <a:ea typeface="Open Sans Light" panose="020B0606030504020204" pitchFamily="34" charset="0"/>
+                <a:cs typeface="Open Sans Light" panose="020B0606030504020204" pitchFamily="34" charset="0"/>
+              </a:rPr>
+              <a:t>__ method, length, etc.</a:t>
+            </a:r>
+          </a:p>
+          <a:p>
+            <a:r>
+              <a:rPr lang="en-US" dirty="0">
+                <a:latin typeface="Open Sans Light" panose="020B0606030504020204" pitchFamily="34" charset="0"/>
+                <a:ea typeface="Open Sans Light" panose="020B0606030504020204" pitchFamily="34" charset="0"/>
+                <a:cs typeface="Open Sans Light" panose="020B0606030504020204" pitchFamily="34" charset="0"/>
+              </a:rPr>
+              <a:t> Use an empty  tuple for clarity / easier than None.</a:t>
+            </a:r>
+          </a:p>
+          <a:p>
+            <a:pPr lvl="1"/>
+            <a:r>
+              <a:rPr lang="en-US" dirty="0">
+                <a:latin typeface="Open Sans Light" panose="020B0606030504020204" pitchFamily="34" charset="0"/>
+                <a:ea typeface="Open Sans Light" panose="020B0606030504020204" pitchFamily="34" charset="0"/>
+                <a:cs typeface="Open Sans Light" panose="020B0606030504020204" pitchFamily="34" charset="0"/>
+              </a:rPr>
+              <a:t> () has lots of useful methods defined, like </a:t>
+            </a:r>
+            <a:r>
+              <a:rPr lang="en-US" dirty="0" err="1">
+                <a:latin typeface="Open Sans Light" panose="020B0606030504020204" pitchFamily="34" charset="0"/>
+                <a:ea typeface="Open Sans Light" panose="020B0606030504020204" pitchFamily="34" charset="0"/>
+                <a:cs typeface="Open Sans Light" panose="020B0606030504020204" pitchFamily="34" charset="0"/>
+              </a:rPr>
+              <a:t>len</a:t>
+            </a:r>
+            <a:r>
+              <a:rPr lang="en-US">
+                <a:latin typeface="Open Sans Light" panose="020B0606030504020204" pitchFamily="34" charset="0"/>
+                <a:ea typeface="Open Sans Light" panose="020B0606030504020204" pitchFamily="34" charset="0"/>
+                <a:cs typeface="Open Sans Light" panose="020B0606030504020204" pitchFamily="34" charset="0"/>
+              </a:rPr>
+              <a:t>()</a:t>
+            </a:r>
+            <a:endParaRPr lang="en-US" dirty="0">
+              <a:latin typeface="Open Sans Light" panose="020B0606030504020204" pitchFamily="34" charset="0"/>
+              <a:ea typeface="Open Sans Light" panose="020B0606030504020204" pitchFamily="34" charset="0"/>
+              <a:cs typeface="Open Sans Light" panose="020B0606030504020204" pitchFamily="34" charset="0"/>
+            </a:endParaRPr>
+          </a:p>
+          <a:p>
+            <a:pPr marL="0" indent="0">
+              <a:buNone/>
+            </a:pPr>
+            <a:endParaRPr lang="en-US" dirty="0">
+              <a:latin typeface="Source Code Pro" panose="020B0509030403020204" pitchFamily="49" charset="77"/>
+            </a:endParaRPr>
+          </a:p>
+        </p:txBody>
+      </p:sp>
+    </p:spTree>
+    <p:extLst>
+      <p:ext uri="{BB962C8B-B14F-4D97-AF65-F5344CB8AC3E}">
+        <p14:creationId xmlns:p14="http://schemas.microsoft.com/office/powerpoint/2010/main" val="1748222650"/>
       </p:ext>
     </p:extLst>
   </p:cSld>

</xml_diff>